<commit_message>
Freshen up files after moving repository
</commit_message>
<xml_diff>
--- a/Neo4J Schema.pptx
+++ b/Neo4J Schema.pptx
@@ -6,6 +6,7 @@
   </p:sldMasterIdLst>
   <p:sldIdLst>
     <p:sldId id="256" r:id="rId2"/>
+    <p:sldId id="257" r:id="rId3"/>
   </p:sldIdLst>
   <p:sldSz cx="9144000" cy="6858000" type="screen4x3"/>
   <p:notesSz cx="6858000" cy="9144000"/>
@@ -288,7 +289,7 @@
           <a:p>
             <a:fld id="{3E625F8F-697C-40A0-8AEB-4E5EF810C132}" type="datetimeFigureOut">
               <a:rPr lang="en-US" smtClean="0"/>
-              <a:t>3/17/2014</a:t>
+              <a:t>5/20/2014</a:t>
             </a:fld>
             <a:endParaRPr lang="en-US"/>
           </a:p>
@@ -458,7 +459,7 @@
           <a:p>
             <a:fld id="{3E625F8F-697C-40A0-8AEB-4E5EF810C132}" type="datetimeFigureOut">
               <a:rPr lang="en-US" smtClean="0"/>
-              <a:t>3/17/2014</a:t>
+              <a:t>5/20/2014</a:t>
             </a:fld>
             <a:endParaRPr lang="en-US"/>
           </a:p>
@@ -638,7 +639,7 @@
           <a:p>
             <a:fld id="{3E625F8F-697C-40A0-8AEB-4E5EF810C132}" type="datetimeFigureOut">
               <a:rPr lang="en-US" smtClean="0"/>
-              <a:t>3/17/2014</a:t>
+              <a:t>5/20/2014</a:t>
             </a:fld>
             <a:endParaRPr lang="en-US"/>
           </a:p>
@@ -808,7 +809,7 @@
           <a:p>
             <a:fld id="{3E625F8F-697C-40A0-8AEB-4E5EF810C132}" type="datetimeFigureOut">
               <a:rPr lang="en-US" smtClean="0"/>
-              <a:t>3/17/2014</a:t>
+              <a:t>5/20/2014</a:t>
             </a:fld>
             <a:endParaRPr lang="en-US"/>
           </a:p>
@@ -1054,7 +1055,7 @@
           <a:p>
             <a:fld id="{3E625F8F-697C-40A0-8AEB-4E5EF810C132}" type="datetimeFigureOut">
               <a:rPr lang="en-US" smtClean="0"/>
-              <a:t>3/17/2014</a:t>
+              <a:t>5/20/2014</a:t>
             </a:fld>
             <a:endParaRPr lang="en-US"/>
           </a:p>
@@ -1342,7 +1343,7 @@
           <a:p>
             <a:fld id="{3E625F8F-697C-40A0-8AEB-4E5EF810C132}" type="datetimeFigureOut">
               <a:rPr lang="en-US" smtClean="0"/>
-              <a:t>3/17/2014</a:t>
+              <a:t>5/20/2014</a:t>
             </a:fld>
             <a:endParaRPr lang="en-US"/>
           </a:p>
@@ -1764,7 +1765,7 @@
           <a:p>
             <a:fld id="{3E625F8F-697C-40A0-8AEB-4E5EF810C132}" type="datetimeFigureOut">
               <a:rPr lang="en-US" smtClean="0"/>
-              <a:t>3/17/2014</a:t>
+              <a:t>5/20/2014</a:t>
             </a:fld>
             <a:endParaRPr lang="en-US"/>
           </a:p>
@@ -1882,7 +1883,7 @@
           <a:p>
             <a:fld id="{3E625F8F-697C-40A0-8AEB-4E5EF810C132}" type="datetimeFigureOut">
               <a:rPr lang="en-US" smtClean="0"/>
-              <a:t>3/17/2014</a:t>
+              <a:t>5/20/2014</a:t>
             </a:fld>
             <a:endParaRPr lang="en-US"/>
           </a:p>
@@ -1977,7 +1978,7 @@
           <a:p>
             <a:fld id="{3E625F8F-697C-40A0-8AEB-4E5EF810C132}" type="datetimeFigureOut">
               <a:rPr lang="en-US" smtClean="0"/>
-              <a:t>3/17/2014</a:t>
+              <a:t>5/20/2014</a:t>
             </a:fld>
             <a:endParaRPr lang="en-US"/>
           </a:p>
@@ -2254,7 +2255,7 @@
           <a:p>
             <a:fld id="{3E625F8F-697C-40A0-8AEB-4E5EF810C132}" type="datetimeFigureOut">
               <a:rPr lang="en-US" smtClean="0"/>
-              <a:t>3/17/2014</a:t>
+              <a:t>5/20/2014</a:t>
             </a:fld>
             <a:endParaRPr lang="en-US"/>
           </a:p>
@@ -2507,7 +2508,7 @@
           <a:p>
             <a:fld id="{3E625F8F-697C-40A0-8AEB-4E5EF810C132}" type="datetimeFigureOut">
               <a:rPr lang="en-US" smtClean="0"/>
-              <a:t>3/17/2014</a:t>
+              <a:t>5/20/2014</a:t>
             </a:fld>
             <a:endParaRPr lang="en-US"/>
           </a:p>
@@ -2720,7 +2721,7 @@
           <a:p>
             <a:fld id="{3E625F8F-697C-40A0-8AEB-4E5EF810C132}" type="datetimeFigureOut">
               <a:rPr lang="en-US" smtClean="0"/>
-              <a:t>3/17/2014</a:t>
+              <a:t>5/20/2014</a:t>
             </a:fld>
             <a:endParaRPr lang="en-US"/>
           </a:p>
@@ -3107,108 +3108,2304 @@
         </p:nvSpPr>
         <p:spPr>
           <a:xfrm>
-            <a:off x="1295400" y="304800"/>
+            <a:off x="1197169" y="304800"/>
             <a:ext cx="6248400" cy="639762"/>
           </a:xfrm>
         </p:spPr>
         <p:txBody>
           <a:bodyPr>
-            <a:normAutofit fontScale="90000"/>
+            <a:noAutofit/>
           </a:bodyPr>
           <a:lstStyle/>
           <a:p>
             <a:r>
-              <a:rPr lang="en-US" dirty="0" smtClean="0"/>
-              <a:t>Neo4J Schema</a:t>
-            </a:r>
-            <a:endParaRPr lang="en-US" dirty="0"/>
-          </a:p>
-        </p:txBody>
-      </p:sp>
-      <p:sp>
-        <p:nvSpPr>
-          <p:cNvPr id="5" name="Rounded Rectangle 4"/>
-          <p:cNvSpPr/>
+              <a:rPr lang="en-US" sz="2800" dirty="0" smtClean="0"/>
+              <a:t>Visibly Connected </a:t>
+            </a:r>
+            <a:br>
+              <a:rPr lang="en-US" sz="2800" dirty="0" smtClean="0"/>
+            </a:br>
+            <a:r>
+              <a:rPr lang="en-US" sz="2800" dirty="0" smtClean="0"/>
+              <a:t>Schema in Neo4J </a:t>
+            </a:r>
+            <a:r>
+              <a:rPr lang="en-US" sz="2800" dirty="0" smtClean="0"/>
+              <a:t>Schema</a:t>
+            </a:r>
+            <a:endParaRPr lang="en-US" sz="2800" dirty="0"/>
+          </a:p>
+        </p:txBody>
+      </p:sp>
+      <p:grpSp>
+        <p:nvGrpSpPr>
+          <p:cNvPr id="2" name="Group 1"/>
+          <p:cNvGrpSpPr/>
           <p:nvPr/>
-        </p:nvSpPr>
+        </p:nvGrpSpPr>
+        <p:grpSpPr>
+          <a:xfrm>
+            <a:off x="211015" y="4081990"/>
+            <a:ext cx="1449261" cy="2450628"/>
+            <a:chOff x="2819400" y="1828800"/>
+            <a:chExt cx="1851378" cy="879226"/>
+          </a:xfrm>
+        </p:grpSpPr>
+        <p:sp>
+          <p:nvSpPr>
+            <p:cNvPr id="5" name="Rounded Rectangle 4"/>
+            <p:cNvSpPr/>
+            <p:nvPr/>
+          </p:nvSpPr>
+          <p:spPr>
+            <a:xfrm>
+              <a:off x="2819400" y="1828800"/>
+              <a:ext cx="1828800" cy="160020"/>
+            </a:xfrm>
+            <a:prstGeom prst="roundRect">
+              <a:avLst>
+                <a:gd name="adj" fmla="val 28413"/>
+              </a:avLst>
+            </a:prstGeom>
+          </p:spPr>
+          <p:style>
+            <a:lnRef idx="2">
+              <a:schemeClr val="accent1">
+                <a:shade val="50000"/>
+              </a:schemeClr>
+            </a:lnRef>
+            <a:fillRef idx="1">
+              <a:schemeClr val="accent1"/>
+            </a:fillRef>
+            <a:effectRef idx="0">
+              <a:schemeClr val="accent1"/>
+            </a:effectRef>
+            <a:fontRef idx="minor">
+              <a:schemeClr val="lt1"/>
+            </a:fontRef>
+          </p:style>
+          <p:txBody>
+            <a:bodyPr rtlCol="0" anchor="ctr"/>
+            <a:lstStyle/>
+            <a:p>
+              <a:pPr algn="ctr"/>
+              <a:r>
+                <a:rPr lang="en-US" sz="1400" dirty="0" smtClean="0"/>
+                <a:t>Funder Node</a:t>
+              </a:r>
+            </a:p>
+            <a:p>
+              <a:pPr algn="ctr"/>
+              <a:r>
+                <a:rPr lang="en-US" sz="1400" dirty="0" smtClean="0"/>
+                <a:t>(financial org.)</a:t>
+              </a:r>
+              <a:endParaRPr lang="en-US" sz="1400" dirty="0"/>
+            </a:p>
+          </p:txBody>
+        </p:sp>
+        <p:sp>
+          <p:nvSpPr>
+            <p:cNvPr id="7" name="Rounded Rectangle 6"/>
+            <p:cNvSpPr/>
+            <p:nvPr/>
+          </p:nvSpPr>
+          <p:spPr>
+            <a:xfrm>
+              <a:off x="2841978" y="1988820"/>
+              <a:ext cx="1828800" cy="719206"/>
+            </a:xfrm>
+            <a:prstGeom prst="roundRect">
+              <a:avLst>
+                <a:gd name="adj" fmla="val 9349"/>
+              </a:avLst>
+            </a:prstGeom>
+          </p:spPr>
+          <p:style>
+            <a:lnRef idx="2">
+              <a:schemeClr val="accent1">
+                <a:shade val="50000"/>
+              </a:schemeClr>
+            </a:lnRef>
+            <a:fillRef idx="1">
+              <a:schemeClr val="accent1"/>
+            </a:fillRef>
+            <a:effectRef idx="0">
+              <a:schemeClr val="accent1"/>
+            </a:effectRef>
+            <a:fontRef idx="minor">
+              <a:schemeClr val="lt1"/>
+            </a:fontRef>
+          </p:style>
+          <p:txBody>
+            <a:bodyPr rtlCol="0" anchor="ctr"/>
+            <a:lstStyle/>
+            <a:p>
+              <a:r>
+                <a:rPr lang="en-US" sz="1000" dirty="0" smtClean="0"/>
+                <a:t>Permalink</a:t>
+              </a:r>
+            </a:p>
+            <a:p>
+              <a:r>
+                <a:rPr lang="en-US" sz="1000" dirty="0" smtClean="0"/>
+                <a:t>Name</a:t>
+              </a:r>
+            </a:p>
+            <a:p>
+              <a:r>
+                <a:rPr lang="en-US" sz="1000" dirty="0" smtClean="0"/>
+                <a:t>Overview</a:t>
+              </a:r>
+            </a:p>
+            <a:p>
+              <a:r>
+                <a:rPr lang="en-US" sz="1000" dirty="0" smtClean="0"/>
+                <a:t>Description</a:t>
+              </a:r>
+            </a:p>
+            <a:p>
+              <a:r>
+                <a:rPr lang="en-US" sz="1000" dirty="0" err="1" smtClean="0"/>
+                <a:t>Homepage_url</a:t>
+              </a:r>
+              <a:endParaRPr lang="en-US" sz="1000" dirty="0" smtClean="0"/>
+            </a:p>
+            <a:p>
+              <a:r>
+                <a:rPr lang="en-US" sz="1000" dirty="0" err="1" smtClean="0"/>
+                <a:t>Blog_url</a:t>
+              </a:r>
+              <a:endParaRPr lang="en-US" sz="1000" dirty="0" smtClean="0"/>
+            </a:p>
+            <a:p>
+              <a:r>
+                <a:rPr lang="en-US" sz="1000" dirty="0" err="1" smtClean="0"/>
+                <a:t>Email_address</a:t>
+              </a:r>
+              <a:endParaRPr lang="en-US" sz="1000" dirty="0" smtClean="0"/>
+            </a:p>
+            <a:p>
+              <a:r>
+                <a:rPr lang="en-US" sz="1000" dirty="0" err="1" smtClean="0"/>
+                <a:t>twitter__username</a:t>
+              </a:r>
+              <a:endParaRPr lang="en-US" sz="1000" dirty="0"/>
+            </a:p>
+            <a:p>
+              <a:r>
+                <a:rPr lang="en-US" sz="1000" dirty="0" err="1" smtClean="0"/>
+                <a:t>Crunchbase_url</a:t>
+              </a:r>
+              <a:endParaRPr lang="en-US" sz="1000" dirty="0"/>
+            </a:p>
+            <a:p>
+              <a:r>
+                <a:rPr lang="en-US" sz="1000" dirty="0" smtClean="0"/>
+                <a:t>Stub</a:t>
+              </a:r>
+              <a:endParaRPr lang="en-US" sz="1000" dirty="0"/>
+            </a:p>
+          </p:txBody>
+        </p:sp>
+      </p:grpSp>
+      <p:grpSp>
+        <p:nvGrpSpPr>
+          <p:cNvPr id="8" name="Group 7"/>
+          <p:cNvGrpSpPr/>
+          <p:nvPr/>
+        </p:nvGrpSpPr>
+        <p:grpSpPr>
+          <a:xfrm>
+            <a:off x="7320454" y="3718291"/>
+            <a:ext cx="1518745" cy="2827869"/>
+            <a:chOff x="2819400" y="1828800"/>
+            <a:chExt cx="1828800" cy="2029142"/>
+          </a:xfrm>
+        </p:grpSpPr>
+        <p:sp>
+          <p:nvSpPr>
+            <p:cNvPr id="9" name="Rounded Rectangle 8"/>
+            <p:cNvSpPr/>
+            <p:nvPr/>
+          </p:nvSpPr>
+          <p:spPr>
+            <a:xfrm>
+              <a:off x="2819400" y="1828800"/>
+              <a:ext cx="1828800" cy="320040"/>
+            </a:xfrm>
+            <a:prstGeom prst="roundRect">
+              <a:avLst>
+                <a:gd name="adj" fmla="val 26277"/>
+              </a:avLst>
+            </a:prstGeom>
+          </p:spPr>
+          <p:style>
+            <a:lnRef idx="2">
+              <a:schemeClr val="accent1">
+                <a:shade val="50000"/>
+              </a:schemeClr>
+            </a:lnRef>
+            <a:fillRef idx="1">
+              <a:schemeClr val="accent1"/>
+            </a:fillRef>
+            <a:effectRef idx="0">
+              <a:schemeClr val="accent1"/>
+            </a:effectRef>
+            <a:fontRef idx="minor">
+              <a:schemeClr val="lt1"/>
+            </a:fontRef>
+          </p:style>
+          <p:txBody>
+            <a:bodyPr rtlCol="0" anchor="ctr"/>
+            <a:lstStyle/>
+            <a:p>
+              <a:pPr algn="ctr"/>
+              <a:r>
+                <a:rPr lang="en-US" sz="1400" dirty="0" smtClean="0"/>
+                <a:t>Company Node</a:t>
+              </a:r>
+            </a:p>
+          </p:txBody>
+        </p:sp>
+        <p:sp>
+          <p:nvSpPr>
+            <p:cNvPr id="10" name="Rounded Rectangle 9"/>
+            <p:cNvSpPr/>
+            <p:nvPr/>
+          </p:nvSpPr>
+          <p:spPr>
+            <a:xfrm>
+              <a:off x="2819400" y="2148841"/>
+              <a:ext cx="1828800" cy="1709101"/>
+            </a:xfrm>
+            <a:prstGeom prst="roundRect">
+              <a:avLst>
+                <a:gd name="adj" fmla="val 10395"/>
+              </a:avLst>
+            </a:prstGeom>
+          </p:spPr>
+          <p:style>
+            <a:lnRef idx="2">
+              <a:schemeClr val="accent1">
+                <a:shade val="50000"/>
+              </a:schemeClr>
+            </a:lnRef>
+            <a:fillRef idx="1">
+              <a:schemeClr val="accent1"/>
+            </a:fillRef>
+            <a:effectRef idx="0">
+              <a:schemeClr val="accent1"/>
+            </a:effectRef>
+            <a:fontRef idx="minor">
+              <a:schemeClr val="lt1"/>
+            </a:fontRef>
+          </p:style>
+          <p:txBody>
+            <a:bodyPr rtlCol="0" anchor="ctr"/>
+            <a:lstStyle/>
+            <a:p>
+              <a:r>
+                <a:rPr lang="en-US" sz="1000" dirty="0"/>
+                <a:t>Permalink</a:t>
+              </a:r>
+            </a:p>
+            <a:p>
+              <a:r>
+                <a:rPr lang="en-US" sz="1000" dirty="0" smtClean="0"/>
+                <a:t>Name</a:t>
+              </a:r>
+            </a:p>
+            <a:p>
+              <a:r>
+                <a:rPr lang="en-US" sz="1000" dirty="0" err="1" smtClean="0"/>
+                <a:t>Category_code</a:t>
+              </a:r>
+              <a:endParaRPr lang="en-US" sz="1000" dirty="0"/>
+            </a:p>
+            <a:p>
+              <a:r>
+                <a:rPr lang="en-US" sz="1000" dirty="0"/>
+                <a:t>Overview</a:t>
+              </a:r>
+            </a:p>
+            <a:p>
+              <a:r>
+                <a:rPr lang="en-US" sz="1000" dirty="0" smtClean="0"/>
+                <a:t>Description</a:t>
+              </a:r>
+            </a:p>
+            <a:p>
+              <a:r>
+                <a:rPr lang="en-US" sz="1000" dirty="0" err="1" smtClean="0"/>
+                <a:t>Total_money_raised</a:t>
+              </a:r>
+              <a:endParaRPr lang="en-US" sz="1000" dirty="0" smtClean="0"/>
+            </a:p>
+            <a:p>
+              <a:r>
+                <a:rPr lang="en-US" sz="1000" dirty="0" err="1" smtClean="0"/>
+                <a:t>Founded_year</a:t>
+              </a:r>
+              <a:endParaRPr lang="en-US" sz="1000" dirty="0" smtClean="0"/>
+            </a:p>
+            <a:p>
+              <a:r>
+                <a:rPr lang="en-US" sz="1000" dirty="0" err="1" smtClean="0"/>
+                <a:t>Homepage_url</a:t>
+              </a:r>
+              <a:endParaRPr lang="en-US" sz="1000" dirty="0"/>
+            </a:p>
+            <a:p>
+              <a:r>
+                <a:rPr lang="en-US" sz="1000" dirty="0" err="1"/>
+                <a:t>Blog_url</a:t>
+              </a:r>
+              <a:endParaRPr lang="en-US" sz="1000" dirty="0"/>
+            </a:p>
+            <a:p>
+              <a:r>
+                <a:rPr lang="en-US" sz="1000" dirty="0" err="1" smtClean="0"/>
+                <a:t>Email_address</a:t>
+              </a:r>
+              <a:endParaRPr lang="en-US" sz="1000" dirty="0"/>
+            </a:p>
+            <a:p>
+              <a:r>
+                <a:rPr lang="en-US" sz="1000" dirty="0" err="1"/>
+                <a:t>twitter__username</a:t>
+              </a:r>
+              <a:endParaRPr lang="en-US" sz="1000" dirty="0"/>
+            </a:p>
+            <a:p>
+              <a:r>
+                <a:rPr lang="en-US" sz="1000" dirty="0" err="1" smtClean="0"/>
+                <a:t>Crunchbase_url</a:t>
+              </a:r>
+              <a:endParaRPr lang="en-US" sz="1000" dirty="0"/>
+            </a:p>
+            <a:p>
+              <a:r>
+                <a:rPr lang="en-US" sz="1000" dirty="0"/>
+                <a:t>Stub</a:t>
+              </a:r>
+            </a:p>
+            <a:p>
+              <a:pPr algn="ctr"/>
+              <a:endParaRPr lang="en-US" sz="1000" dirty="0"/>
+            </a:p>
+          </p:txBody>
+        </p:sp>
+      </p:grpSp>
+      <p:grpSp>
+        <p:nvGrpSpPr>
+          <p:cNvPr id="11" name="Group 10"/>
+          <p:cNvGrpSpPr/>
+          <p:nvPr/>
+        </p:nvGrpSpPr>
+        <p:grpSpPr>
+          <a:xfrm>
+            <a:off x="7432127" y="1070867"/>
+            <a:ext cx="1295400" cy="1657335"/>
+            <a:chOff x="2819400" y="1828800"/>
+            <a:chExt cx="1828800" cy="1090391"/>
+          </a:xfrm>
+        </p:grpSpPr>
+        <p:sp>
+          <p:nvSpPr>
+            <p:cNvPr id="12" name="Rounded Rectangle 11"/>
+            <p:cNvSpPr/>
+            <p:nvPr/>
+          </p:nvSpPr>
+          <p:spPr>
+            <a:xfrm>
+              <a:off x="2819400" y="1828800"/>
+              <a:ext cx="1828800" cy="320040"/>
+            </a:xfrm>
+            <a:prstGeom prst="roundRect">
+              <a:avLst>
+                <a:gd name="adj" fmla="val 29395"/>
+              </a:avLst>
+            </a:prstGeom>
+          </p:spPr>
+          <p:style>
+            <a:lnRef idx="2">
+              <a:schemeClr val="accent1">
+                <a:shade val="50000"/>
+              </a:schemeClr>
+            </a:lnRef>
+            <a:fillRef idx="1">
+              <a:schemeClr val="accent1"/>
+            </a:fillRef>
+            <a:effectRef idx="0">
+              <a:schemeClr val="accent1"/>
+            </a:effectRef>
+            <a:fontRef idx="minor">
+              <a:schemeClr val="lt1"/>
+            </a:fontRef>
+          </p:style>
+          <p:txBody>
+            <a:bodyPr rtlCol="0" anchor="ctr"/>
+            <a:lstStyle/>
+            <a:p>
+              <a:pPr algn="ctr"/>
+              <a:r>
+                <a:rPr lang="en-US" sz="1400" dirty="0" smtClean="0"/>
+                <a:t>Person Node</a:t>
+              </a:r>
+              <a:endParaRPr lang="en-US" sz="1400" dirty="0"/>
+            </a:p>
+          </p:txBody>
+        </p:sp>
+        <p:sp>
+          <p:nvSpPr>
+            <p:cNvPr id="13" name="Rounded Rectangle 12"/>
+            <p:cNvSpPr/>
+            <p:nvPr/>
+          </p:nvSpPr>
+          <p:spPr>
+            <a:xfrm>
+              <a:off x="2819400" y="2148840"/>
+              <a:ext cx="1828800" cy="770351"/>
+            </a:xfrm>
+            <a:prstGeom prst="roundRect">
+              <a:avLst>
+                <a:gd name="adj" fmla="val 12600"/>
+              </a:avLst>
+            </a:prstGeom>
+          </p:spPr>
+          <p:style>
+            <a:lnRef idx="2">
+              <a:schemeClr val="accent1">
+                <a:shade val="50000"/>
+              </a:schemeClr>
+            </a:lnRef>
+            <a:fillRef idx="1">
+              <a:schemeClr val="accent1"/>
+            </a:fillRef>
+            <a:effectRef idx="0">
+              <a:schemeClr val="accent1"/>
+            </a:effectRef>
+            <a:fontRef idx="minor">
+              <a:schemeClr val="lt1"/>
+            </a:fontRef>
+          </p:style>
+          <p:txBody>
+            <a:bodyPr rtlCol="0" anchor="ctr"/>
+            <a:lstStyle/>
+            <a:p>
+              <a:r>
+                <a:rPr lang="en-US" sz="1000" dirty="0" smtClean="0"/>
+                <a:t>Permalink</a:t>
+              </a:r>
+            </a:p>
+            <a:p>
+              <a:r>
+                <a:rPr lang="en-US" sz="1000" dirty="0" err="1" smtClean="0"/>
+                <a:t>First_name</a:t>
+              </a:r>
+              <a:endParaRPr lang="en-US" sz="1000" dirty="0" smtClean="0"/>
+            </a:p>
+            <a:p>
+              <a:r>
+                <a:rPr lang="en-US" sz="1000" dirty="0" err="1" smtClean="0"/>
+                <a:t>Lastname</a:t>
+              </a:r>
+              <a:endParaRPr lang="en-US" sz="1000" dirty="0" smtClean="0"/>
+            </a:p>
+            <a:p>
+              <a:r>
+                <a:rPr lang="en-US" sz="1000" dirty="0" err="1" smtClean="0"/>
+                <a:t>Affiliation_name</a:t>
+              </a:r>
+              <a:endParaRPr lang="en-US" sz="1000" dirty="0" smtClean="0"/>
+            </a:p>
+            <a:p>
+              <a:r>
+                <a:rPr lang="en-US" sz="1000" dirty="0" err="1"/>
+                <a:t>c</a:t>
+              </a:r>
+              <a:r>
+                <a:rPr lang="en-US" sz="1000" dirty="0" err="1" smtClean="0"/>
+                <a:t>runchbase_url</a:t>
+              </a:r>
+              <a:endParaRPr lang="en-US" sz="1000" dirty="0" smtClean="0"/>
+            </a:p>
+            <a:p>
+              <a:r>
+                <a:rPr lang="en-US" sz="1000" dirty="0" smtClean="0"/>
+                <a:t>Stub</a:t>
+              </a:r>
+              <a:endParaRPr lang="en-US" sz="1000" dirty="0"/>
+            </a:p>
+          </p:txBody>
+        </p:sp>
+      </p:grpSp>
+      <p:grpSp>
+        <p:nvGrpSpPr>
+          <p:cNvPr id="23" name="Group 22"/>
+          <p:cNvGrpSpPr/>
+          <p:nvPr/>
+        </p:nvGrpSpPr>
+        <p:grpSpPr>
+          <a:xfrm>
+            <a:off x="367890" y="1267313"/>
+            <a:ext cx="6580816" cy="3977399"/>
+            <a:chOff x="301312" y="1035698"/>
+            <a:chExt cx="6580816" cy="3977399"/>
+          </a:xfrm>
+        </p:grpSpPr>
+        <p:grpSp>
+          <p:nvGrpSpPr>
+            <p:cNvPr id="6" name="Group 5"/>
+            <p:cNvGrpSpPr/>
+            <p:nvPr/>
+          </p:nvGrpSpPr>
+          <p:grpSpPr>
+            <a:xfrm>
+              <a:off x="609600" y="1035698"/>
+              <a:ext cx="5515666" cy="2665811"/>
+              <a:chOff x="161234" y="4514649"/>
+              <a:chExt cx="3851323" cy="1560836"/>
+            </a:xfrm>
+          </p:grpSpPr>
+          <p:sp>
+            <p:nvSpPr>
+              <p:cNvPr id="3" name="Oval 2"/>
+              <p:cNvSpPr/>
+              <p:nvPr/>
+            </p:nvSpPr>
+            <p:spPr>
+              <a:xfrm>
+                <a:off x="161234" y="4582255"/>
+                <a:ext cx="1143000" cy="521677"/>
+              </a:xfrm>
+              <a:prstGeom prst="ellipse">
+                <a:avLst/>
+              </a:prstGeom>
+            </p:spPr>
+            <p:style>
+              <a:lnRef idx="2">
+                <a:schemeClr val="accent1">
+                  <a:shade val="50000"/>
+                </a:schemeClr>
+              </a:lnRef>
+              <a:fillRef idx="1">
+                <a:schemeClr val="accent1"/>
+              </a:fillRef>
+              <a:effectRef idx="0">
+                <a:schemeClr val="accent1"/>
+              </a:effectRef>
+              <a:fontRef idx="minor">
+                <a:schemeClr val="lt1"/>
+              </a:fontRef>
+            </p:style>
+            <p:txBody>
+              <a:bodyPr rtlCol="0" anchor="ctr"/>
+              <a:lstStyle/>
+              <a:p>
+                <a:pPr algn="ctr"/>
+                <a:r>
+                  <a:rPr lang="en-US" sz="1600" dirty="0" smtClean="0"/>
+                  <a:t>Funder</a:t>
+                </a:r>
+                <a:endParaRPr lang="en-US" sz="1600" dirty="0"/>
+              </a:p>
+            </p:txBody>
+          </p:sp>
+          <p:sp>
+            <p:nvSpPr>
+              <p:cNvPr id="15" name="Oval 14"/>
+              <p:cNvSpPr/>
+              <p:nvPr/>
+            </p:nvSpPr>
+            <p:spPr>
+              <a:xfrm>
+                <a:off x="1547780" y="5553808"/>
+                <a:ext cx="1143000" cy="521677"/>
+              </a:xfrm>
+              <a:prstGeom prst="ellipse">
+                <a:avLst/>
+              </a:prstGeom>
+            </p:spPr>
+            <p:style>
+              <a:lnRef idx="2">
+                <a:schemeClr val="accent1">
+                  <a:shade val="50000"/>
+                </a:schemeClr>
+              </a:lnRef>
+              <a:fillRef idx="1">
+                <a:schemeClr val="accent1"/>
+              </a:fillRef>
+              <a:effectRef idx="0">
+                <a:schemeClr val="accent1"/>
+              </a:effectRef>
+              <a:fontRef idx="minor">
+                <a:schemeClr val="lt1"/>
+              </a:fontRef>
+            </p:style>
+            <p:txBody>
+              <a:bodyPr rtlCol="0" anchor="ctr"/>
+              <a:lstStyle/>
+              <a:p>
+                <a:pPr algn="ctr"/>
+                <a:r>
+                  <a:rPr lang="en-US" sz="1600" dirty="0" smtClean="0"/>
+                  <a:t>Company</a:t>
+                </a:r>
+                <a:endParaRPr lang="en-US" sz="1600" dirty="0"/>
+              </a:p>
+            </p:txBody>
+          </p:sp>
+          <p:sp>
+            <p:nvSpPr>
+              <p:cNvPr id="16" name="Oval 15"/>
+              <p:cNvSpPr/>
+              <p:nvPr/>
+            </p:nvSpPr>
+            <p:spPr>
+              <a:xfrm>
+                <a:off x="2869557" y="4514649"/>
+                <a:ext cx="1143000" cy="521677"/>
+              </a:xfrm>
+              <a:prstGeom prst="ellipse">
+                <a:avLst/>
+              </a:prstGeom>
+            </p:spPr>
+            <p:style>
+              <a:lnRef idx="2">
+                <a:schemeClr val="accent1">
+                  <a:shade val="50000"/>
+                </a:schemeClr>
+              </a:lnRef>
+              <a:fillRef idx="1">
+                <a:schemeClr val="accent1"/>
+              </a:fillRef>
+              <a:effectRef idx="0">
+                <a:schemeClr val="accent1"/>
+              </a:effectRef>
+              <a:fontRef idx="minor">
+                <a:schemeClr val="lt1"/>
+              </a:fontRef>
+            </p:style>
+            <p:txBody>
+              <a:bodyPr rtlCol="0" anchor="ctr"/>
+              <a:lstStyle/>
+              <a:p>
+                <a:pPr algn="ctr"/>
+                <a:r>
+                  <a:rPr lang="en-US" sz="1600" dirty="0" smtClean="0"/>
+                  <a:t>Person</a:t>
+                </a:r>
+                <a:endParaRPr lang="en-US" sz="1600" dirty="0"/>
+              </a:p>
+            </p:txBody>
+          </p:sp>
+          <p:cxnSp>
+            <p:nvCxnSpPr>
+              <p:cNvPr id="14" name="Curved Connector 13"/>
+              <p:cNvCxnSpPr>
+                <a:stCxn id="3" idx="6"/>
+                <a:endCxn id="15" idx="0"/>
+              </p:cNvCxnSpPr>
+              <p:nvPr/>
+            </p:nvCxnSpPr>
+            <p:spPr>
+              <a:xfrm>
+                <a:off x="1304234" y="4843094"/>
+                <a:ext cx="815046" cy="710714"/>
+              </a:xfrm>
+              <a:prstGeom prst="curvedConnector2">
+                <a:avLst/>
+              </a:prstGeom>
+              <a:ln w="38100">
+                <a:solidFill>
+                  <a:srgbClr val="92D050"/>
+                </a:solidFill>
+                <a:tailEnd type="stealth" w="med" len="lg"/>
+              </a:ln>
+            </p:spPr>
+            <p:style>
+              <a:lnRef idx="1">
+                <a:schemeClr val="accent1"/>
+              </a:lnRef>
+              <a:fillRef idx="0">
+                <a:schemeClr val="accent1"/>
+              </a:fillRef>
+              <a:effectRef idx="0">
+                <a:schemeClr val="accent1"/>
+              </a:effectRef>
+              <a:fontRef idx="minor">
+                <a:schemeClr val="tx1"/>
+              </a:fontRef>
+            </p:style>
+          </p:cxnSp>
+          <p:cxnSp>
+            <p:nvCxnSpPr>
+              <p:cNvPr id="18" name="Curved Connector 17"/>
+              <p:cNvCxnSpPr>
+                <a:stCxn id="16" idx="2"/>
+                <a:endCxn id="15" idx="0"/>
+              </p:cNvCxnSpPr>
+              <p:nvPr/>
+            </p:nvCxnSpPr>
+            <p:spPr>
+              <a:xfrm rot="10800000" flipV="1">
+                <a:off x="2119281" y="4775488"/>
+                <a:ext cx="750277" cy="778320"/>
+              </a:xfrm>
+              <a:prstGeom prst="curvedConnector2">
+                <a:avLst/>
+              </a:prstGeom>
+              <a:ln w="38100">
+                <a:solidFill>
+                  <a:srgbClr val="92D050"/>
+                </a:solidFill>
+                <a:tailEnd type="stealth" w="med" len="lg"/>
+              </a:ln>
+            </p:spPr>
+            <p:style>
+              <a:lnRef idx="1">
+                <a:schemeClr val="accent1"/>
+              </a:lnRef>
+              <a:fillRef idx="0">
+                <a:schemeClr val="accent1"/>
+              </a:fillRef>
+              <a:effectRef idx="0">
+                <a:schemeClr val="accent1"/>
+              </a:effectRef>
+              <a:fontRef idx="minor">
+                <a:schemeClr val="tx1"/>
+              </a:fontRef>
+            </p:style>
+          </p:cxnSp>
+          <p:cxnSp>
+            <p:nvCxnSpPr>
+              <p:cNvPr id="26" name="Curved Connector 25"/>
+              <p:cNvCxnSpPr>
+                <a:stCxn id="15" idx="3"/>
+                <a:endCxn id="15" idx="1"/>
+              </p:cNvCxnSpPr>
+              <p:nvPr/>
+            </p:nvCxnSpPr>
+            <p:spPr>
+              <a:xfrm rot="5400000" flipH="1">
+                <a:off x="1530727" y="5814647"/>
+                <a:ext cx="368881" cy="12700"/>
+              </a:xfrm>
+              <a:prstGeom prst="curvedConnector5">
+                <a:avLst>
+                  <a:gd name="adj1" fmla="val -61971"/>
+                  <a:gd name="adj2" fmla="val 5328118"/>
+                  <a:gd name="adj3" fmla="val 125317"/>
+                </a:avLst>
+              </a:prstGeom>
+              <a:ln w="38100">
+                <a:solidFill>
+                  <a:srgbClr val="92D050"/>
+                </a:solidFill>
+                <a:tailEnd type="stealth" w="med" len="lg"/>
+              </a:ln>
+            </p:spPr>
+            <p:style>
+              <a:lnRef idx="1">
+                <a:schemeClr val="accent1"/>
+              </a:lnRef>
+              <a:fillRef idx="0">
+                <a:schemeClr val="accent1"/>
+              </a:fillRef>
+              <a:effectRef idx="0">
+                <a:schemeClr val="accent1"/>
+              </a:effectRef>
+              <a:fontRef idx="minor">
+                <a:schemeClr val="tx1"/>
+              </a:fontRef>
+            </p:style>
+          </p:cxnSp>
+          <p:cxnSp>
+            <p:nvCxnSpPr>
+              <p:cNvPr id="1041" name="Curved Connector 1040"/>
+              <p:cNvCxnSpPr>
+                <a:stCxn id="16" idx="3"/>
+                <a:endCxn id="15" idx="7"/>
+              </p:cNvCxnSpPr>
+              <p:nvPr/>
+            </p:nvCxnSpPr>
+            <p:spPr>
+              <a:xfrm rot="5400000">
+                <a:off x="2445030" y="5038291"/>
+                <a:ext cx="670278" cy="513553"/>
+              </a:xfrm>
+              <a:prstGeom prst="curvedConnector3">
+                <a:avLst>
+                  <a:gd name="adj1" fmla="val 50000"/>
+                </a:avLst>
+              </a:prstGeom>
+              <a:ln w="38100">
+                <a:solidFill>
+                  <a:srgbClr val="FF0000"/>
+                </a:solidFill>
+                <a:tailEnd type="arrow"/>
+              </a:ln>
+            </p:spPr>
+            <p:style>
+              <a:lnRef idx="1">
+                <a:schemeClr val="accent1"/>
+              </a:lnRef>
+              <a:fillRef idx="0">
+                <a:schemeClr val="accent1"/>
+              </a:fillRef>
+              <a:effectRef idx="0">
+                <a:schemeClr val="accent1"/>
+              </a:effectRef>
+              <a:fontRef idx="minor">
+                <a:schemeClr val="tx1"/>
+              </a:fontRef>
+            </p:style>
+          </p:cxnSp>
+          <p:cxnSp>
+            <p:nvCxnSpPr>
+              <p:cNvPr id="57" name="Curved Connector 56"/>
+              <p:cNvCxnSpPr>
+                <a:stCxn id="16" idx="4"/>
+                <a:endCxn id="15" idx="6"/>
+              </p:cNvCxnSpPr>
+              <p:nvPr/>
+            </p:nvCxnSpPr>
+            <p:spPr>
+              <a:xfrm rot="5400000">
+                <a:off x="2676759" y="5050348"/>
+                <a:ext cx="778321" cy="750277"/>
+              </a:xfrm>
+              <a:prstGeom prst="curvedConnector2">
+                <a:avLst/>
+              </a:prstGeom>
+              <a:ln w="38100">
+                <a:solidFill>
+                  <a:srgbClr val="C00000"/>
+                </a:solidFill>
+                <a:tailEnd type="arrow"/>
+              </a:ln>
+            </p:spPr>
+            <p:style>
+              <a:lnRef idx="1">
+                <a:schemeClr val="accent1"/>
+              </a:lnRef>
+              <a:fillRef idx="0">
+                <a:schemeClr val="accent1"/>
+              </a:fillRef>
+              <a:effectRef idx="0">
+                <a:schemeClr val="accent1"/>
+              </a:effectRef>
+              <a:fontRef idx="minor">
+                <a:schemeClr val="tx1"/>
+              </a:fontRef>
+            </p:style>
+          </p:cxnSp>
+          <p:cxnSp>
+            <p:nvCxnSpPr>
+              <p:cNvPr id="58" name="Curved Connector 57"/>
+              <p:cNvCxnSpPr>
+                <a:stCxn id="16" idx="4"/>
+                <a:endCxn id="15" idx="5"/>
+              </p:cNvCxnSpPr>
+              <p:nvPr/>
+            </p:nvCxnSpPr>
+            <p:spPr>
+              <a:xfrm rot="5400000">
+                <a:off x="2500845" y="5058874"/>
+                <a:ext cx="962761" cy="917665"/>
+              </a:xfrm>
+              <a:prstGeom prst="curvedConnector3">
+                <a:avLst>
+                  <a:gd name="adj1" fmla="val 130967"/>
+                </a:avLst>
+              </a:prstGeom>
+              <a:ln w="38100">
+                <a:solidFill>
+                  <a:srgbClr val="0070C0"/>
+                </a:solidFill>
+                <a:tailEnd type="arrow"/>
+              </a:ln>
+            </p:spPr>
+            <p:style>
+              <a:lnRef idx="1">
+                <a:schemeClr val="accent1"/>
+              </a:lnRef>
+              <a:fillRef idx="0">
+                <a:schemeClr val="accent1"/>
+              </a:fillRef>
+              <a:effectRef idx="0">
+                <a:schemeClr val="accent1"/>
+              </a:effectRef>
+              <a:fontRef idx="minor">
+                <a:schemeClr val="tx1"/>
+              </a:fontRef>
+            </p:style>
+          </p:cxnSp>
+        </p:grpSp>
+        <p:sp>
+          <p:nvSpPr>
+            <p:cNvPr id="22" name="Line Callout 3 (Accent Bar) 21"/>
+            <p:cNvSpPr/>
+            <p:nvPr/>
+          </p:nvSpPr>
+          <p:spPr>
+            <a:xfrm>
+              <a:off x="301312" y="2776927"/>
+              <a:ext cx="1250991" cy="293557"/>
+            </a:xfrm>
+            <a:prstGeom prst="accentCallout3">
+              <a:avLst>
+                <a:gd name="adj1" fmla="val 58685"/>
+                <a:gd name="adj2" fmla="val 107839"/>
+                <a:gd name="adj3" fmla="val -93330"/>
+                <a:gd name="adj4" fmla="val 128150"/>
+                <a:gd name="adj5" fmla="val -208703"/>
+                <a:gd name="adj6" fmla="val 158003"/>
+                <a:gd name="adj7" fmla="val -294584"/>
+                <a:gd name="adj8" fmla="val 198986"/>
+              </a:avLst>
+            </a:prstGeom>
+            <a:noFill/>
+            <a:ln>
+              <a:solidFill>
+                <a:schemeClr val="bg1">
+                  <a:lumMod val="65000"/>
+                </a:schemeClr>
+              </a:solidFill>
+              <a:prstDash val="dash"/>
+            </a:ln>
+          </p:spPr>
+          <p:style>
+            <a:lnRef idx="2">
+              <a:schemeClr val="accent1">
+                <a:shade val="50000"/>
+              </a:schemeClr>
+            </a:lnRef>
+            <a:fillRef idx="1">
+              <a:schemeClr val="accent1"/>
+            </a:fillRef>
+            <a:effectRef idx="0">
+              <a:schemeClr val="accent1"/>
+            </a:effectRef>
+            <a:fontRef idx="minor">
+              <a:schemeClr val="lt1"/>
+            </a:fontRef>
+          </p:style>
+          <p:txBody>
+            <a:bodyPr lIns="0" rIns="0" rtlCol="0" anchor="ctr"/>
+            <a:lstStyle/>
+            <a:p>
+              <a:pPr algn="r"/>
+              <a:r>
+                <a:rPr lang="en-US" sz="1400" dirty="0" smtClean="0">
+                  <a:solidFill>
+                    <a:schemeClr val="tx1"/>
+                  </a:solidFill>
+                </a:rPr>
+                <a:t>Funded Edge </a:t>
+              </a:r>
+            </a:p>
+          </p:txBody>
+        </p:sp>
+        <p:sp>
+          <p:nvSpPr>
+            <p:cNvPr id="40" name="Line Callout 3 (Accent Bar) 39"/>
+            <p:cNvSpPr/>
+            <p:nvPr/>
+          </p:nvSpPr>
+          <p:spPr>
+            <a:xfrm>
+              <a:off x="5638800" y="3311815"/>
+              <a:ext cx="1243328" cy="288143"/>
+            </a:xfrm>
+            <a:prstGeom prst="accentCallout3">
+              <a:avLst>
+                <a:gd name="adj1" fmla="val 18750"/>
+                <a:gd name="adj2" fmla="val -8333"/>
+                <a:gd name="adj3" fmla="val -46276"/>
+                <a:gd name="adj4" fmla="val -27708"/>
+                <a:gd name="adj5" fmla="val -146412"/>
+                <a:gd name="adj6" fmla="val -49797"/>
+                <a:gd name="adj7" fmla="val -331873"/>
+                <a:gd name="adj8" fmla="val -78102"/>
+              </a:avLst>
+            </a:prstGeom>
+            <a:noFill/>
+            <a:ln>
+              <a:solidFill>
+                <a:schemeClr val="bg1">
+                  <a:lumMod val="65000"/>
+                </a:schemeClr>
+              </a:solidFill>
+              <a:prstDash val="dash"/>
+            </a:ln>
+          </p:spPr>
+          <p:style>
+            <a:lnRef idx="2">
+              <a:schemeClr val="accent1">
+                <a:shade val="50000"/>
+              </a:schemeClr>
+            </a:lnRef>
+            <a:fillRef idx="1">
+              <a:schemeClr val="accent1"/>
+            </a:fillRef>
+            <a:effectRef idx="0">
+              <a:schemeClr val="accent1"/>
+            </a:effectRef>
+            <a:fontRef idx="minor">
+              <a:schemeClr val="lt1"/>
+            </a:fontRef>
+          </p:style>
+          <p:txBody>
+            <a:bodyPr lIns="0" rtlCol="0" anchor="ctr"/>
+            <a:lstStyle/>
+            <a:p>
+              <a:r>
+                <a:rPr lang="en-US" sz="1400" dirty="0" smtClean="0">
+                  <a:solidFill>
+                    <a:schemeClr val="tx1"/>
+                  </a:solidFill>
+                </a:rPr>
+                <a:t>Founder Edge </a:t>
+              </a:r>
+            </a:p>
+          </p:txBody>
+        </p:sp>
+        <p:sp>
+          <p:nvSpPr>
+            <p:cNvPr id="42" name="Line Callout 3 (Accent Bar) 41"/>
+            <p:cNvSpPr/>
+            <p:nvPr/>
+          </p:nvSpPr>
+          <p:spPr>
+            <a:xfrm>
+              <a:off x="5503602" y="4081990"/>
+              <a:ext cx="1243328" cy="263292"/>
+            </a:xfrm>
+            <a:prstGeom prst="accentCallout3">
+              <a:avLst>
+                <a:gd name="adj1" fmla="val 18750"/>
+                <a:gd name="adj2" fmla="val -8333"/>
+                <a:gd name="adj3" fmla="val -45839"/>
+                <a:gd name="adj4" fmla="val -25822"/>
+                <a:gd name="adj5" fmla="val -175572"/>
+                <a:gd name="adj6" fmla="val -48854"/>
+                <a:gd name="adj7" fmla="val -309988"/>
+                <a:gd name="adj8" fmla="val -67730"/>
+              </a:avLst>
+            </a:prstGeom>
+            <a:noFill/>
+            <a:ln>
+              <a:solidFill>
+                <a:schemeClr val="bg1">
+                  <a:lumMod val="65000"/>
+                </a:schemeClr>
+              </a:solidFill>
+              <a:prstDash val="dash"/>
+            </a:ln>
+          </p:spPr>
+          <p:style>
+            <a:lnRef idx="2">
+              <a:schemeClr val="accent1">
+                <a:shade val="50000"/>
+              </a:schemeClr>
+            </a:lnRef>
+            <a:fillRef idx="1">
+              <a:schemeClr val="accent1"/>
+            </a:fillRef>
+            <a:effectRef idx="0">
+              <a:schemeClr val="accent1"/>
+            </a:effectRef>
+            <a:fontRef idx="minor">
+              <a:schemeClr val="lt1"/>
+            </a:fontRef>
+          </p:style>
+          <p:txBody>
+            <a:bodyPr lIns="0" rtlCol="0" anchor="ctr"/>
+            <a:lstStyle/>
+            <a:p>
+              <a:r>
+                <a:rPr lang="en-US" sz="1400" dirty="0" smtClean="0">
+                  <a:solidFill>
+                    <a:schemeClr val="tx1"/>
+                  </a:solidFill>
+                </a:rPr>
+                <a:t>C-Suite Edge </a:t>
+              </a:r>
+            </a:p>
+          </p:txBody>
+        </p:sp>
+        <p:sp>
+          <p:nvSpPr>
+            <p:cNvPr id="43" name="Line Callout 3 (Accent Bar) 42"/>
+            <p:cNvSpPr/>
+            <p:nvPr/>
+          </p:nvSpPr>
+          <p:spPr>
+            <a:xfrm>
+              <a:off x="5105400" y="4800600"/>
+              <a:ext cx="1243328" cy="212497"/>
+            </a:xfrm>
+            <a:prstGeom prst="accentCallout3">
+              <a:avLst>
+                <a:gd name="adj1" fmla="val 18750"/>
+                <a:gd name="adj2" fmla="val -8333"/>
+                <a:gd name="adj3" fmla="val -74966"/>
+                <a:gd name="adj4" fmla="val -26766"/>
+                <a:gd name="adj5" fmla="val -178072"/>
+                <a:gd name="adj6" fmla="val -43197"/>
+                <a:gd name="adj7" fmla="val -331885"/>
+                <a:gd name="adj8" fmla="val -60186"/>
+              </a:avLst>
+            </a:prstGeom>
+            <a:noFill/>
+            <a:ln>
+              <a:solidFill>
+                <a:schemeClr val="bg1">
+                  <a:lumMod val="65000"/>
+                </a:schemeClr>
+              </a:solidFill>
+              <a:prstDash val="dash"/>
+            </a:ln>
+          </p:spPr>
+          <p:style>
+            <a:lnRef idx="2">
+              <a:schemeClr val="accent1">
+                <a:shade val="50000"/>
+              </a:schemeClr>
+            </a:lnRef>
+            <a:fillRef idx="1">
+              <a:schemeClr val="accent1"/>
+            </a:fillRef>
+            <a:effectRef idx="0">
+              <a:schemeClr val="accent1"/>
+            </a:effectRef>
+            <a:fontRef idx="minor">
+              <a:schemeClr val="lt1"/>
+            </a:fontRef>
+          </p:style>
+          <p:txBody>
+            <a:bodyPr lIns="0" rtlCol="0" anchor="ctr"/>
+            <a:lstStyle/>
+            <a:p>
+              <a:r>
+                <a:rPr lang="en-US" sz="1400" dirty="0" smtClean="0">
+                  <a:solidFill>
+                    <a:schemeClr val="tx1"/>
+                  </a:solidFill>
+                </a:rPr>
+                <a:t>Advisor Edge </a:t>
+              </a:r>
+            </a:p>
+          </p:txBody>
+        </p:sp>
+      </p:grpSp>
+    </p:spTree>
+    <p:extLst>
+      <p:ext uri="{BB962C8B-B14F-4D97-AF65-F5344CB8AC3E}">
+        <p14:creationId xmlns:p14="http://schemas.microsoft.com/office/powerpoint/2010/main" val="1682049037"/>
+      </p:ext>
+    </p:extLst>
+  </p:cSld>
+  <p:clrMapOvr>
+    <a:masterClrMapping/>
+  </p:clrMapOvr>
+</p:sld>
+</file>
+
+<file path=ppt/slides/slide2.xml><?xml version="1.0" encoding="utf-8"?>
+<p:sld xmlns:a="http://schemas.openxmlformats.org/drawingml/2006/main" xmlns:r="http://schemas.openxmlformats.org/officeDocument/2006/relationships" xmlns:p="http://schemas.openxmlformats.org/presentationml/2006/main">
+  <p:cSld>
+    <p:spTree>
+      <p:nvGrpSpPr>
+        <p:cNvPr id="1" name=""/>
+        <p:cNvGrpSpPr/>
+        <p:nvPr/>
+      </p:nvGrpSpPr>
+      <p:grpSpPr>
+        <a:xfrm>
+          <a:off x="0" y="0"/>
+          <a:ext cx="0" cy="0"/>
+          <a:chOff x="0" y="0"/>
+          <a:chExt cx="0" cy="0"/>
+        </a:xfrm>
+      </p:grpSpPr>
+      <p:sp>
+        <p:nvSpPr>
+          <p:cNvPr id="2" name="Title 1"/>
+          <p:cNvSpPr>
+            <a:spLocks noGrp="1"/>
+          </p:cNvSpPr>
+          <p:nvPr>
+            <p:ph type="title"/>
+          </p:nvPr>
+        </p:nvSpPr>
+        <p:spPr/>
+        <p:txBody>
+          <a:bodyPr>
+            <a:normAutofit/>
+          </a:bodyPr>
+          <a:lstStyle/>
+          <a:p>
+            <a:r>
+              <a:rPr lang="en-US" sz="2800" dirty="0" smtClean="0"/>
+              <a:t>Edge / Relationship Schema</a:t>
+            </a:r>
+            <a:endParaRPr lang="en-US" sz="2800" dirty="0"/>
+          </a:p>
+        </p:txBody>
+      </p:sp>
+      <p:cxnSp>
+        <p:nvCxnSpPr>
+          <p:cNvPr id="4" name="Curved Connector 3"/>
+          <p:cNvCxnSpPr>
+            <a:stCxn id="13" idx="3"/>
+            <a:endCxn id="13" idx="0"/>
+          </p:cNvCxnSpPr>
+          <p:nvPr/>
+        </p:nvCxnSpPr>
         <p:spPr>
-          <a:xfrm>
-            <a:off x="2819400" y="1828800"/>
-            <a:ext cx="1828800" cy="533400"/>
+          <a:xfrm flipH="1" flipV="1">
+            <a:off x="6598920" y="2221794"/>
+            <a:ext cx="731520" cy="223009"/>
           </a:xfrm>
-          <a:prstGeom prst="roundRect">
-            <a:avLst/>
+          <a:prstGeom prst="curvedConnector4">
+            <a:avLst>
+              <a:gd name="adj1" fmla="val -31250"/>
+              <a:gd name="adj2" fmla="val 202507"/>
+            </a:avLst>
           </a:prstGeom>
+          <a:ln w="38100">
+            <a:solidFill>
+              <a:srgbClr val="0070C0"/>
+            </a:solidFill>
+            <a:tailEnd type="stealth" w="med" len="lg"/>
+          </a:ln>
         </p:spPr>
         <p:style>
-          <a:lnRef idx="2">
-            <a:schemeClr val="accent1">
-              <a:shade val="50000"/>
-            </a:schemeClr>
+          <a:lnRef idx="1">
+            <a:schemeClr val="accent1"/>
           </a:lnRef>
-          <a:fillRef idx="1">
+          <a:fillRef idx="0">
             <a:schemeClr val="accent1"/>
           </a:fillRef>
           <a:effectRef idx="0">
             <a:schemeClr val="accent1"/>
           </a:effectRef>
           <a:fontRef idx="minor">
-            <a:schemeClr val="lt1"/>
+            <a:schemeClr val="tx1"/>
           </a:fontRef>
         </p:style>
-        <p:txBody>
-          <a:bodyPr rtlCol="0" anchor="ctr"/>
-          <a:lstStyle/>
-          <a:p>
-            <a:pPr algn="ctr"/>
-            <a:endParaRPr lang="en-US"/>
-          </a:p>
-        </p:txBody>
-      </p:sp>
-      <p:sp>
-        <p:nvSpPr>
-          <p:cNvPr id="7" name="Rounded Rectangle 6"/>
-          <p:cNvSpPr/>
+      </p:cxnSp>
+      <p:cxnSp>
+        <p:nvCxnSpPr>
+          <p:cNvPr id="5" name="Curved Connector 4"/>
+          <p:cNvCxnSpPr>
+            <a:stCxn id="13" idx="1"/>
+            <a:endCxn id="13" idx="0"/>
+          </p:cNvCxnSpPr>
           <p:nvPr/>
-        </p:nvSpPr>
+        </p:nvCxnSpPr>
         <p:spPr>
-          <a:xfrm>
-            <a:off x="2819400" y="2362200"/>
-            <a:ext cx="1828800" cy="533400"/>
+          <a:xfrm rot="10800000" flipH="1">
+            <a:off x="5867400" y="2221795"/>
+            <a:ext cx="731520" cy="223009"/>
           </a:xfrm>
-          <a:prstGeom prst="roundRect">
-            <a:avLst/>
+          <a:prstGeom prst="curvedConnector4">
+            <a:avLst>
+              <a:gd name="adj1" fmla="val -31250"/>
+              <a:gd name="adj2" fmla="val 202507"/>
+            </a:avLst>
           </a:prstGeom>
+          <a:ln w="38100">
+            <a:solidFill>
+              <a:srgbClr val="C00000"/>
+            </a:solidFill>
+            <a:tailEnd type="stealth" w="med" len="lg"/>
+          </a:ln>
         </p:spPr>
         <p:style>
-          <a:lnRef idx="2">
-            <a:schemeClr val="accent1">
-              <a:shade val="50000"/>
-            </a:schemeClr>
+          <a:lnRef idx="1">
+            <a:schemeClr val="accent1"/>
           </a:lnRef>
-          <a:fillRef idx="1">
+          <a:fillRef idx="0">
             <a:schemeClr val="accent1"/>
           </a:fillRef>
           <a:effectRef idx="0">
             <a:schemeClr val="accent1"/>
           </a:effectRef>
           <a:fontRef idx="minor">
-            <a:schemeClr val="lt1"/>
+            <a:schemeClr val="tx1"/>
           </a:fontRef>
         </p:style>
-        <p:txBody>
-          <a:bodyPr rtlCol="0" anchor="ctr"/>
-          <a:lstStyle/>
-          <a:p>
-            <a:pPr algn="ctr"/>
-            <a:endParaRPr lang="en-US"/>
-          </a:p>
-        </p:txBody>
-      </p:sp>
+      </p:cxnSp>
+      <p:cxnSp>
+        <p:nvCxnSpPr>
+          <p:cNvPr id="6" name="Curved Connector 5"/>
+          <p:cNvCxnSpPr>
+            <a:stCxn id="16" idx="0"/>
+            <a:endCxn id="16" idx="3"/>
+          </p:cNvCxnSpPr>
+          <p:nvPr/>
+        </p:nvCxnSpPr>
+        <p:spPr>
+          <a:xfrm rot="16200000" flipH="1">
+            <a:off x="4567175" y="1967539"/>
+            <a:ext cx="223009" cy="731520"/>
+          </a:xfrm>
+          <a:prstGeom prst="curvedConnector4">
+            <a:avLst>
+              <a:gd name="adj1" fmla="val -102507"/>
+              <a:gd name="adj2" fmla="val 131250"/>
+            </a:avLst>
+          </a:prstGeom>
+          <a:ln w="38100">
+            <a:solidFill>
+              <a:srgbClr val="FF0000"/>
+            </a:solidFill>
+            <a:tailEnd type="stealth" w="med" len="lg"/>
+          </a:ln>
+        </p:spPr>
+        <p:style>
+          <a:lnRef idx="1">
+            <a:schemeClr val="accent1"/>
+          </a:lnRef>
+          <a:fillRef idx="0">
+            <a:schemeClr val="accent1"/>
+          </a:fillRef>
+          <a:effectRef idx="0">
+            <a:schemeClr val="accent1"/>
+          </a:effectRef>
+          <a:fontRef idx="minor">
+            <a:schemeClr val="tx1"/>
+          </a:fontRef>
+        </p:style>
+      </p:cxnSp>
+      <p:cxnSp>
+        <p:nvCxnSpPr>
+          <p:cNvPr id="7" name="Curved Connector 6"/>
+          <p:cNvCxnSpPr>
+            <a:stCxn id="10" idx="0"/>
+            <a:endCxn id="10" idx="3"/>
+          </p:cNvCxnSpPr>
+          <p:nvPr/>
+        </p:nvCxnSpPr>
+        <p:spPr>
+          <a:xfrm rot="16200000" flipH="1">
+            <a:off x="2433575" y="1967687"/>
+            <a:ext cx="223009" cy="731520"/>
+          </a:xfrm>
+          <a:prstGeom prst="curvedConnector4">
+            <a:avLst>
+              <a:gd name="adj1" fmla="val -102507"/>
+              <a:gd name="adj2" fmla="val 131250"/>
+            </a:avLst>
+          </a:prstGeom>
+          <a:ln w="38100">
+            <a:solidFill>
+              <a:srgbClr val="92D050"/>
+            </a:solidFill>
+            <a:tailEnd type="stealth" w="med" len="lg"/>
+          </a:ln>
+        </p:spPr>
+        <p:style>
+          <a:lnRef idx="1">
+            <a:schemeClr val="accent1"/>
+          </a:lnRef>
+          <a:fillRef idx="0">
+            <a:schemeClr val="accent1"/>
+          </a:fillRef>
+          <a:effectRef idx="0">
+            <a:schemeClr val="accent1"/>
+          </a:effectRef>
+          <a:fontRef idx="minor">
+            <a:schemeClr val="tx1"/>
+          </a:fontRef>
+        </p:style>
+      </p:cxnSp>
+      <p:grpSp>
+        <p:nvGrpSpPr>
+          <p:cNvPr id="8" name="Group 7"/>
+          <p:cNvGrpSpPr/>
+          <p:nvPr/>
+        </p:nvGrpSpPr>
+        <p:grpSpPr>
+          <a:xfrm>
+            <a:off x="1447800" y="2221943"/>
+            <a:ext cx="1463040" cy="2828165"/>
+            <a:chOff x="5562600" y="3247320"/>
+            <a:chExt cx="1463040" cy="2828165"/>
+          </a:xfrm>
+        </p:grpSpPr>
+        <p:sp>
+          <p:nvSpPr>
+            <p:cNvPr id="9" name="Rounded Rectangle 8"/>
+            <p:cNvSpPr/>
+            <p:nvPr/>
+          </p:nvSpPr>
+          <p:spPr>
+            <a:xfrm>
+              <a:off x="5562600" y="3693634"/>
+              <a:ext cx="1463040" cy="2381851"/>
+            </a:xfrm>
+            <a:prstGeom prst="roundRect">
+              <a:avLst>
+                <a:gd name="adj" fmla="val 9456"/>
+              </a:avLst>
+            </a:prstGeom>
+            <a:noFill/>
+          </p:spPr>
+          <p:style>
+            <a:lnRef idx="2">
+              <a:schemeClr val="accent1">
+                <a:shade val="50000"/>
+              </a:schemeClr>
+            </a:lnRef>
+            <a:fillRef idx="1">
+              <a:schemeClr val="accent1"/>
+            </a:fillRef>
+            <a:effectRef idx="0">
+              <a:schemeClr val="accent1"/>
+            </a:effectRef>
+            <a:fontRef idx="minor">
+              <a:schemeClr val="lt1"/>
+            </a:fontRef>
+          </p:style>
+          <p:txBody>
+            <a:bodyPr rtlCol="0" anchor="ctr"/>
+            <a:lstStyle/>
+            <a:p>
+              <a:r>
+                <a:rPr lang="en-US" sz="1000" dirty="0">
+                  <a:solidFill>
+                    <a:srgbClr val="000000"/>
+                  </a:solidFill>
+                </a:rPr>
+                <a:t>Permalink</a:t>
+              </a:r>
+            </a:p>
+            <a:p>
+              <a:r>
+                <a:rPr lang="en-US" sz="1000" dirty="0" smtClean="0">
+                  <a:solidFill>
+                    <a:srgbClr val="000000"/>
+                  </a:solidFill>
+                </a:rPr>
+                <a:t>Name</a:t>
+              </a:r>
+            </a:p>
+            <a:p>
+              <a:r>
+                <a:rPr lang="en-US" sz="1000" dirty="0" err="1" smtClean="0">
+                  <a:solidFill>
+                    <a:srgbClr val="000000"/>
+                  </a:solidFill>
+                </a:rPr>
+                <a:t>Category_code</a:t>
+              </a:r>
+              <a:endParaRPr lang="en-US" sz="1000" dirty="0">
+                <a:solidFill>
+                  <a:srgbClr val="000000"/>
+                </a:solidFill>
+              </a:endParaRPr>
+            </a:p>
+            <a:p>
+              <a:r>
+                <a:rPr lang="en-US" sz="1000" dirty="0">
+                  <a:solidFill>
+                    <a:srgbClr val="000000"/>
+                  </a:solidFill>
+                </a:rPr>
+                <a:t>Overview</a:t>
+              </a:r>
+            </a:p>
+            <a:p>
+              <a:r>
+                <a:rPr lang="en-US" sz="1000" dirty="0" smtClean="0">
+                  <a:solidFill>
+                    <a:srgbClr val="000000"/>
+                  </a:solidFill>
+                </a:rPr>
+                <a:t>Description</a:t>
+              </a:r>
+            </a:p>
+            <a:p>
+              <a:r>
+                <a:rPr lang="en-US" sz="1000" dirty="0" err="1" smtClean="0">
+                  <a:solidFill>
+                    <a:srgbClr val="000000"/>
+                  </a:solidFill>
+                </a:rPr>
+                <a:t>Total_money_raised</a:t>
+              </a:r>
+              <a:endParaRPr lang="en-US" sz="1000" dirty="0" smtClean="0">
+                <a:solidFill>
+                  <a:srgbClr val="000000"/>
+                </a:solidFill>
+              </a:endParaRPr>
+            </a:p>
+            <a:p>
+              <a:r>
+                <a:rPr lang="en-US" sz="1000" dirty="0" err="1" smtClean="0">
+                  <a:solidFill>
+                    <a:srgbClr val="000000"/>
+                  </a:solidFill>
+                </a:rPr>
+                <a:t>Founded_year</a:t>
+              </a:r>
+              <a:endParaRPr lang="en-US" sz="1000" dirty="0" smtClean="0">
+                <a:solidFill>
+                  <a:srgbClr val="000000"/>
+                </a:solidFill>
+              </a:endParaRPr>
+            </a:p>
+            <a:p>
+              <a:r>
+                <a:rPr lang="en-US" sz="1000" dirty="0" err="1" smtClean="0">
+                  <a:solidFill>
+                    <a:srgbClr val="000000"/>
+                  </a:solidFill>
+                </a:rPr>
+                <a:t>Homepage_url</a:t>
+              </a:r>
+              <a:endParaRPr lang="en-US" sz="1000" dirty="0">
+                <a:solidFill>
+                  <a:srgbClr val="000000"/>
+                </a:solidFill>
+              </a:endParaRPr>
+            </a:p>
+            <a:p>
+              <a:r>
+                <a:rPr lang="en-US" sz="1000" dirty="0" err="1">
+                  <a:solidFill>
+                    <a:srgbClr val="000000"/>
+                  </a:solidFill>
+                </a:rPr>
+                <a:t>Blog_url</a:t>
+              </a:r>
+              <a:endParaRPr lang="en-US" sz="1000" dirty="0">
+                <a:solidFill>
+                  <a:srgbClr val="000000"/>
+                </a:solidFill>
+              </a:endParaRPr>
+            </a:p>
+            <a:p>
+              <a:r>
+                <a:rPr lang="en-US" sz="1000" dirty="0" err="1" smtClean="0">
+                  <a:solidFill>
+                    <a:srgbClr val="000000"/>
+                  </a:solidFill>
+                </a:rPr>
+                <a:t>Email_address</a:t>
+              </a:r>
+              <a:endParaRPr lang="en-US" sz="1000" dirty="0">
+                <a:solidFill>
+                  <a:srgbClr val="000000"/>
+                </a:solidFill>
+              </a:endParaRPr>
+            </a:p>
+            <a:p>
+              <a:r>
+                <a:rPr lang="en-US" sz="1000" dirty="0" err="1">
+                  <a:solidFill>
+                    <a:srgbClr val="000000"/>
+                  </a:solidFill>
+                </a:rPr>
+                <a:t>twitter__username</a:t>
+              </a:r>
+              <a:endParaRPr lang="en-US" sz="1000" dirty="0">
+                <a:solidFill>
+                  <a:srgbClr val="000000"/>
+                </a:solidFill>
+              </a:endParaRPr>
+            </a:p>
+            <a:p>
+              <a:r>
+                <a:rPr lang="en-US" sz="1000" dirty="0" err="1" smtClean="0">
+                  <a:solidFill>
+                    <a:srgbClr val="000000"/>
+                  </a:solidFill>
+                </a:rPr>
+                <a:t>Crunchbase_url</a:t>
+              </a:r>
+              <a:endParaRPr lang="en-US" sz="1000" dirty="0">
+                <a:solidFill>
+                  <a:srgbClr val="000000"/>
+                </a:solidFill>
+              </a:endParaRPr>
+            </a:p>
+            <a:p>
+              <a:r>
+                <a:rPr lang="en-US" sz="1000" dirty="0">
+                  <a:solidFill>
+                    <a:srgbClr val="000000"/>
+                  </a:solidFill>
+                </a:rPr>
+                <a:t>Stub</a:t>
+              </a:r>
+            </a:p>
+            <a:p>
+              <a:pPr algn="ctr"/>
+              <a:endParaRPr lang="en-US" sz="1000" dirty="0">
+                <a:solidFill>
+                  <a:srgbClr val="000000"/>
+                </a:solidFill>
+              </a:endParaRPr>
+            </a:p>
+          </p:txBody>
+        </p:sp>
+        <p:sp>
+          <p:nvSpPr>
+            <p:cNvPr id="10" name="Rounded Rectangle 9"/>
+            <p:cNvSpPr/>
+            <p:nvPr/>
+          </p:nvSpPr>
+          <p:spPr>
+            <a:xfrm>
+              <a:off x="5562600" y="3247320"/>
+              <a:ext cx="1463040" cy="446017"/>
+            </a:xfrm>
+            <a:prstGeom prst="roundRect">
+              <a:avLst>
+                <a:gd name="adj" fmla="val 26687"/>
+              </a:avLst>
+            </a:prstGeom>
+            <a:noFill/>
+          </p:spPr>
+          <p:style>
+            <a:lnRef idx="2">
+              <a:schemeClr val="accent1">
+                <a:shade val="50000"/>
+              </a:schemeClr>
+            </a:lnRef>
+            <a:fillRef idx="1">
+              <a:schemeClr val="accent1"/>
+            </a:fillRef>
+            <a:effectRef idx="0">
+              <a:schemeClr val="accent1"/>
+            </a:effectRef>
+            <a:fontRef idx="minor">
+              <a:schemeClr val="lt1"/>
+            </a:fontRef>
+          </p:style>
+          <p:txBody>
+            <a:bodyPr rtlCol="0" anchor="ctr"/>
+            <a:lstStyle/>
+            <a:p>
+              <a:pPr algn="ctr"/>
+              <a:r>
+                <a:rPr lang="en-US" sz="1400" dirty="0" smtClean="0">
+                  <a:solidFill>
+                    <a:srgbClr val="000000"/>
+                  </a:solidFill>
+                </a:rPr>
+                <a:t>Funded Relationship</a:t>
+              </a:r>
+              <a:endParaRPr lang="en-US" sz="1400" dirty="0">
+                <a:solidFill>
+                  <a:srgbClr val="000000"/>
+                </a:solidFill>
+              </a:endParaRPr>
+            </a:p>
+          </p:txBody>
+        </p:sp>
+      </p:grpSp>
+      <p:grpSp>
+        <p:nvGrpSpPr>
+          <p:cNvPr id="11" name="Group 10"/>
+          <p:cNvGrpSpPr/>
+          <p:nvPr/>
+        </p:nvGrpSpPr>
+        <p:grpSpPr>
+          <a:xfrm>
+            <a:off x="5867400" y="2221794"/>
+            <a:ext cx="1463040" cy="2828165"/>
+            <a:chOff x="5562600" y="3247320"/>
+            <a:chExt cx="1463040" cy="2828165"/>
+          </a:xfrm>
+        </p:grpSpPr>
+        <p:sp>
+          <p:nvSpPr>
+            <p:cNvPr id="12" name="Rounded Rectangle 11"/>
+            <p:cNvSpPr/>
+            <p:nvPr/>
+          </p:nvSpPr>
+          <p:spPr>
+            <a:xfrm>
+              <a:off x="5562600" y="3693634"/>
+              <a:ext cx="1463040" cy="2381851"/>
+            </a:xfrm>
+            <a:prstGeom prst="roundRect">
+              <a:avLst>
+                <a:gd name="adj" fmla="val 9456"/>
+              </a:avLst>
+            </a:prstGeom>
+            <a:noFill/>
+          </p:spPr>
+          <p:style>
+            <a:lnRef idx="2">
+              <a:schemeClr val="accent1">
+                <a:shade val="50000"/>
+              </a:schemeClr>
+            </a:lnRef>
+            <a:fillRef idx="1">
+              <a:schemeClr val="accent1"/>
+            </a:fillRef>
+            <a:effectRef idx="0">
+              <a:schemeClr val="accent1"/>
+            </a:effectRef>
+            <a:fontRef idx="minor">
+              <a:schemeClr val="lt1"/>
+            </a:fontRef>
+          </p:style>
+          <p:txBody>
+            <a:bodyPr rtlCol="0" anchor="ctr"/>
+            <a:lstStyle/>
+            <a:p>
+              <a:r>
+                <a:rPr lang="en-US" sz="1000" dirty="0">
+                  <a:solidFill>
+                    <a:srgbClr val="000000"/>
+                  </a:solidFill>
+                </a:rPr>
+                <a:t>Permalink</a:t>
+              </a:r>
+            </a:p>
+            <a:p>
+              <a:r>
+                <a:rPr lang="en-US" sz="1000" dirty="0" smtClean="0">
+                  <a:solidFill>
+                    <a:srgbClr val="000000"/>
+                  </a:solidFill>
+                </a:rPr>
+                <a:t>Name</a:t>
+              </a:r>
+            </a:p>
+            <a:p>
+              <a:r>
+                <a:rPr lang="en-US" sz="1000" dirty="0" err="1" smtClean="0">
+                  <a:solidFill>
+                    <a:srgbClr val="000000"/>
+                  </a:solidFill>
+                </a:rPr>
+                <a:t>Category_code</a:t>
+              </a:r>
+              <a:endParaRPr lang="en-US" sz="1000" dirty="0">
+                <a:solidFill>
+                  <a:srgbClr val="000000"/>
+                </a:solidFill>
+              </a:endParaRPr>
+            </a:p>
+            <a:p>
+              <a:r>
+                <a:rPr lang="en-US" sz="1000" dirty="0">
+                  <a:solidFill>
+                    <a:srgbClr val="000000"/>
+                  </a:solidFill>
+                </a:rPr>
+                <a:t>Overview</a:t>
+              </a:r>
+            </a:p>
+            <a:p>
+              <a:r>
+                <a:rPr lang="en-US" sz="1000" dirty="0" smtClean="0">
+                  <a:solidFill>
+                    <a:srgbClr val="000000"/>
+                  </a:solidFill>
+                </a:rPr>
+                <a:t>Description</a:t>
+              </a:r>
+            </a:p>
+            <a:p>
+              <a:r>
+                <a:rPr lang="en-US" sz="1000" dirty="0" err="1" smtClean="0">
+                  <a:solidFill>
+                    <a:srgbClr val="000000"/>
+                  </a:solidFill>
+                </a:rPr>
+                <a:t>Total_money_raised</a:t>
+              </a:r>
+              <a:endParaRPr lang="en-US" sz="1000" dirty="0" smtClean="0">
+                <a:solidFill>
+                  <a:srgbClr val="000000"/>
+                </a:solidFill>
+              </a:endParaRPr>
+            </a:p>
+            <a:p>
+              <a:r>
+                <a:rPr lang="en-US" sz="1000" dirty="0" err="1" smtClean="0">
+                  <a:solidFill>
+                    <a:srgbClr val="000000"/>
+                  </a:solidFill>
+                </a:rPr>
+                <a:t>Founded_year</a:t>
+              </a:r>
+              <a:endParaRPr lang="en-US" sz="1000" dirty="0" smtClean="0">
+                <a:solidFill>
+                  <a:srgbClr val="000000"/>
+                </a:solidFill>
+              </a:endParaRPr>
+            </a:p>
+            <a:p>
+              <a:r>
+                <a:rPr lang="en-US" sz="1000" dirty="0" err="1" smtClean="0">
+                  <a:solidFill>
+                    <a:srgbClr val="000000"/>
+                  </a:solidFill>
+                </a:rPr>
+                <a:t>Homepage_url</a:t>
+              </a:r>
+              <a:endParaRPr lang="en-US" sz="1000" dirty="0">
+                <a:solidFill>
+                  <a:srgbClr val="000000"/>
+                </a:solidFill>
+              </a:endParaRPr>
+            </a:p>
+            <a:p>
+              <a:r>
+                <a:rPr lang="en-US" sz="1000" dirty="0" err="1">
+                  <a:solidFill>
+                    <a:srgbClr val="000000"/>
+                  </a:solidFill>
+                </a:rPr>
+                <a:t>Blog_url</a:t>
+              </a:r>
+              <a:endParaRPr lang="en-US" sz="1000" dirty="0">
+                <a:solidFill>
+                  <a:srgbClr val="000000"/>
+                </a:solidFill>
+              </a:endParaRPr>
+            </a:p>
+            <a:p>
+              <a:r>
+                <a:rPr lang="en-US" sz="1000" dirty="0" err="1" smtClean="0">
+                  <a:solidFill>
+                    <a:srgbClr val="000000"/>
+                  </a:solidFill>
+                </a:rPr>
+                <a:t>Email_address</a:t>
+              </a:r>
+              <a:endParaRPr lang="en-US" sz="1000" dirty="0">
+                <a:solidFill>
+                  <a:srgbClr val="000000"/>
+                </a:solidFill>
+              </a:endParaRPr>
+            </a:p>
+            <a:p>
+              <a:r>
+                <a:rPr lang="en-US" sz="1000" dirty="0" err="1">
+                  <a:solidFill>
+                    <a:srgbClr val="000000"/>
+                  </a:solidFill>
+                </a:rPr>
+                <a:t>twitter__username</a:t>
+              </a:r>
+              <a:endParaRPr lang="en-US" sz="1000" dirty="0">
+                <a:solidFill>
+                  <a:srgbClr val="000000"/>
+                </a:solidFill>
+              </a:endParaRPr>
+            </a:p>
+            <a:p>
+              <a:r>
+                <a:rPr lang="en-US" sz="1000" dirty="0" err="1" smtClean="0">
+                  <a:solidFill>
+                    <a:srgbClr val="000000"/>
+                  </a:solidFill>
+                </a:rPr>
+                <a:t>Crunchbase_url</a:t>
+              </a:r>
+              <a:endParaRPr lang="en-US" sz="1000" dirty="0">
+                <a:solidFill>
+                  <a:srgbClr val="000000"/>
+                </a:solidFill>
+              </a:endParaRPr>
+            </a:p>
+            <a:p>
+              <a:r>
+                <a:rPr lang="en-US" sz="1000" dirty="0">
+                  <a:solidFill>
+                    <a:srgbClr val="000000"/>
+                  </a:solidFill>
+                </a:rPr>
+                <a:t>Stub</a:t>
+              </a:r>
+            </a:p>
+            <a:p>
+              <a:pPr algn="ctr"/>
+              <a:endParaRPr lang="en-US" sz="1000" dirty="0">
+                <a:solidFill>
+                  <a:srgbClr val="000000"/>
+                </a:solidFill>
+              </a:endParaRPr>
+            </a:p>
+          </p:txBody>
+        </p:sp>
+        <p:sp>
+          <p:nvSpPr>
+            <p:cNvPr id="13" name="Rounded Rectangle 12"/>
+            <p:cNvSpPr/>
+            <p:nvPr/>
+          </p:nvSpPr>
+          <p:spPr>
+            <a:xfrm>
+              <a:off x="5562600" y="3247320"/>
+              <a:ext cx="1463040" cy="446017"/>
+            </a:xfrm>
+            <a:prstGeom prst="roundRect">
+              <a:avLst>
+                <a:gd name="adj" fmla="val 26687"/>
+              </a:avLst>
+            </a:prstGeom>
+            <a:noFill/>
+          </p:spPr>
+          <p:style>
+            <a:lnRef idx="2">
+              <a:schemeClr val="accent1">
+                <a:shade val="50000"/>
+              </a:schemeClr>
+            </a:lnRef>
+            <a:fillRef idx="1">
+              <a:schemeClr val="accent1"/>
+            </a:fillRef>
+            <a:effectRef idx="0">
+              <a:schemeClr val="accent1"/>
+            </a:effectRef>
+            <a:fontRef idx="minor">
+              <a:schemeClr val="lt1"/>
+            </a:fontRef>
+          </p:style>
+          <p:txBody>
+            <a:bodyPr rtlCol="0" anchor="ctr"/>
+            <a:lstStyle/>
+            <a:p>
+              <a:pPr algn="ctr"/>
+              <a:r>
+                <a:rPr lang="en-US" sz="1400" dirty="0" smtClean="0">
+                  <a:solidFill>
+                    <a:srgbClr val="000000"/>
+                  </a:solidFill>
+                </a:rPr>
+                <a:t>VP</a:t>
+              </a:r>
+              <a:r>
+                <a:rPr lang="en-US" sz="1400" smtClean="0">
+                  <a:solidFill>
+                    <a:srgbClr val="000000"/>
+                  </a:solidFill>
+                </a:rPr>
+                <a:t>, CEO, </a:t>
+              </a:r>
+              <a:r>
+                <a:rPr lang="en-US" sz="1400" dirty="0" smtClean="0">
+                  <a:solidFill>
+                    <a:srgbClr val="000000"/>
+                  </a:solidFill>
+                </a:rPr>
+                <a:t>Advisor Relationship</a:t>
+              </a:r>
+              <a:endParaRPr lang="en-US" sz="1400" dirty="0">
+                <a:solidFill>
+                  <a:srgbClr val="000000"/>
+                </a:solidFill>
+              </a:endParaRPr>
+            </a:p>
+          </p:txBody>
+        </p:sp>
+      </p:grpSp>
+      <p:grpSp>
+        <p:nvGrpSpPr>
+          <p:cNvPr id="14" name="Group 13"/>
+          <p:cNvGrpSpPr/>
+          <p:nvPr/>
+        </p:nvGrpSpPr>
+        <p:grpSpPr>
+          <a:xfrm>
+            <a:off x="3581400" y="2221795"/>
+            <a:ext cx="1463040" cy="2828165"/>
+            <a:chOff x="5562600" y="3247320"/>
+            <a:chExt cx="1463040" cy="2828165"/>
+          </a:xfrm>
+        </p:grpSpPr>
+        <p:sp>
+          <p:nvSpPr>
+            <p:cNvPr id="15" name="Rounded Rectangle 14"/>
+            <p:cNvSpPr/>
+            <p:nvPr/>
+          </p:nvSpPr>
+          <p:spPr>
+            <a:xfrm>
+              <a:off x="5562600" y="3693634"/>
+              <a:ext cx="1463040" cy="2381851"/>
+            </a:xfrm>
+            <a:prstGeom prst="roundRect">
+              <a:avLst>
+                <a:gd name="adj" fmla="val 9456"/>
+              </a:avLst>
+            </a:prstGeom>
+            <a:noFill/>
+          </p:spPr>
+          <p:style>
+            <a:lnRef idx="2">
+              <a:schemeClr val="accent1">
+                <a:shade val="50000"/>
+              </a:schemeClr>
+            </a:lnRef>
+            <a:fillRef idx="1">
+              <a:schemeClr val="accent1"/>
+            </a:fillRef>
+            <a:effectRef idx="0">
+              <a:schemeClr val="accent1"/>
+            </a:effectRef>
+            <a:fontRef idx="minor">
+              <a:schemeClr val="lt1"/>
+            </a:fontRef>
+          </p:style>
+          <p:txBody>
+            <a:bodyPr rtlCol="0" anchor="ctr"/>
+            <a:lstStyle/>
+            <a:p>
+              <a:r>
+                <a:rPr lang="en-US" sz="1000" dirty="0">
+                  <a:solidFill>
+                    <a:srgbClr val="000000"/>
+                  </a:solidFill>
+                </a:rPr>
+                <a:t>Permalink</a:t>
+              </a:r>
+            </a:p>
+            <a:p>
+              <a:r>
+                <a:rPr lang="en-US" sz="1000" dirty="0" smtClean="0">
+                  <a:solidFill>
+                    <a:srgbClr val="000000"/>
+                  </a:solidFill>
+                </a:rPr>
+                <a:t>Name</a:t>
+              </a:r>
+            </a:p>
+            <a:p>
+              <a:r>
+                <a:rPr lang="en-US" sz="1000" dirty="0" err="1" smtClean="0">
+                  <a:solidFill>
+                    <a:srgbClr val="000000"/>
+                  </a:solidFill>
+                </a:rPr>
+                <a:t>Category_code</a:t>
+              </a:r>
+              <a:endParaRPr lang="en-US" sz="1000" dirty="0">
+                <a:solidFill>
+                  <a:srgbClr val="000000"/>
+                </a:solidFill>
+              </a:endParaRPr>
+            </a:p>
+            <a:p>
+              <a:r>
+                <a:rPr lang="en-US" sz="1000" dirty="0">
+                  <a:solidFill>
+                    <a:srgbClr val="000000"/>
+                  </a:solidFill>
+                </a:rPr>
+                <a:t>Overview</a:t>
+              </a:r>
+            </a:p>
+            <a:p>
+              <a:r>
+                <a:rPr lang="en-US" sz="1000" dirty="0" smtClean="0">
+                  <a:solidFill>
+                    <a:srgbClr val="000000"/>
+                  </a:solidFill>
+                </a:rPr>
+                <a:t>Description</a:t>
+              </a:r>
+            </a:p>
+            <a:p>
+              <a:r>
+                <a:rPr lang="en-US" sz="1000" dirty="0" err="1" smtClean="0">
+                  <a:solidFill>
+                    <a:srgbClr val="000000"/>
+                  </a:solidFill>
+                </a:rPr>
+                <a:t>Total_money_raised</a:t>
+              </a:r>
+              <a:endParaRPr lang="en-US" sz="1000" dirty="0" smtClean="0">
+                <a:solidFill>
+                  <a:srgbClr val="000000"/>
+                </a:solidFill>
+              </a:endParaRPr>
+            </a:p>
+            <a:p>
+              <a:r>
+                <a:rPr lang="en-US" sz="1000" dirty="0" err="1" smtClean="0">
+                  <a:solidFill>
+                    <a:srgbClr val="000000"/>
+                  </a:solidFill>
+                </a:rPr>
+                <a:t>Founded_year</a:t>
+              </a:r>
+              <a:endParaRPr lang="en-US" sz="1000" dirty="0" smtClean="0">
+                <a:solidFill>
+                  <a:srgbClr val="000000"/>
+                </a:solidFill>
+              </a:endParaRPr>
+            </a:p>
+            <a:p>
+              <a:r>
+                <a:rPr lang="en-US" sz="1000" dirty="0" err="1" smtClean="0">
+                  <a:solidFill>
+                    <a:srgbClr val="000000"/>
+                  </a:solidFill>
+                </a:rPr>
+                <a:t>Homepage_url</a:t>
+              </a:r>
+              <a:endParaRPr lang="en-US" sz="1000" dirty="0">
+                <a:solidFill>
+                  <a:srgbClr val="000000"/>
+                </a:solidFill>
+              </a:endParaRPr>
+            </a:p>
+            <a:p>
+              <a:r>
+                <a:rPr lang="en-US" sz="1000" dirty="0" err="1">
+                  <a:solidFill>
+                    <a:srgbClr val="000000"/>
+                  </a:solidFill>
+                </a:rPr>
+                <a:t>Blog_url</a:t>
+              </a:r>
+              <a:endParaRPr lang="en-US" sz="1000" dirty="0">
+                <a:solidFill>
+                  <a:srgbClr val="000000"/>
+                </a:solidFill>
+              </a:endParaRPr>
+            </a:p>
+            <a:p>
+              <a:r>
+                <a:rPr lang="en-US" sz="1000" dirty="0" err="1" smtClean="0">
+                  <a:solidFill>
+                    <a:srgbClr val="000000"/>
+                  </a:solidFill>
+                </a:rPr>
+                <a:t>Email_address</a:t>
+              </a:r>
+              <a:endParaRPr lang="en-US" sz="1000" dirty="0">
+                <a:solidFill>
+                  <a:srgbClr val="000000"/>
+                </a:solidFill>
+              </a:endParaRPr>
+            </a:p>
+            <a:p>
+              <a:r>
+                <a:rPr lang="en-US" sz="1000" dirty="0" err="1">
+                  <a:solidFill>
+                    <a:srgbClr val="000000"/>
+                  </a:solidFill>
+                </a:rPr>
+                <a:t>twitter__username</a:t>
+              </a:r>
+              <a:endParaRPr lang="en-US" sz="1000" dirty="0">
+                <a:solidFill>
+                  <a:srgbClr val="000000"/>
+                </a:solidFill>
+              </a:endParaRPr>
+            </a:p>
+            <a:p>
+              <a:r>
+                <a:rPr lang="en-US" sz="1000" dirty="0" err="1" smtClean="0">
+                  <a:solidFill>
+                    <a:srgbClr val="000000"/>
+                  </a:solidFill>
+                </a:rPr>
+                <a:t>Crunchbase_url</a:t>
+              </a:r>
+              <a:endParaRPr lang="en-US" sz="1000" dirty="0">
+                <a:solidFill>
+                  <a:srgbClr val="000000"/>
+                </a:solidFill>
+              </a:endParaRPr>
+            </a:p>
+            <a:p>
+              <a:r>
+                <a:rPr lang="en-US" sz="1000" dirty="0">
+                  <a:solidFill>
+                    <a:srgbClr val="000000"/>
+                  </a:solidFill>
+                </a:rPr>
+                <a:t>Stub</a:t>
+              </a:r>
+            </a:p>
+            <a:p>
+              <a:pPr algn="ctr"/>
+              <a:endParaRPr lang="en-US" sz="1000" dirty="0">
+                <a:solidFill>
+                  <a:srgbClr val="000000"/>
+                </a:solidFill>
+              </a:endParaRPr>
+            </a:p>
+          </p:txBody>
+        </p:sp>
+        <p:sp>
+          <p:nvSpPr>
+            <p:cNvPr id="16" name="Rounded Rectangle 15"/>
+            <p:cNvSpPr/>
+            <p:nvPr/>
+          </p:nvSpPr>
+          <p:spPr>
+            <a:xfrm>
+              <a:off x="5562600" y="3247320"/>
+              <a:ext cx="1463040" cy="446017"/>
+            </a:xfrm>
+            <a:prstGeom prst="roundRect">
+              <a:avLst>
+                <a:gd name="adj" fmla="val 26687"/>
+              </a:avLst>
+            </a:prstGeom>
+            <a:noFill/>
+          </p:spPr>
+          <p:style>
+            <a:lnRef idx="2">
+              <a:schemeClr val="accent1">
+                <a:shade val="50000"/>
+              </a:schemeClr>
+            </a:lnRef>
+            <a:fillRef idx="1">
+              <a:schemeClr val="accent1"/>
+            </a:fillRef>
+            <a:effectRef idx="0">
+              <a:schemeClr val="accent1"/>
+            </a:effectRef>
+            <a:fontRef idx="minor">
+              <a:schemeClr val="lt1"/>
+            </a:fontRef>
+          </p:style>
+          <p:txBody>
+            <a:bodyPr rtlCol="0" anchor="ctr"/>
+            <a:lstStyle/>
+            <a:p>
+              <a:pPr algn="ctr"/>
+              <a:r>
+                <a:rPr lang="en-US" sz="1400" dirty="0" smtClean="0">
+                  <a:solidFill>
+                    <a:srgbClr val="000000"/>
+                  </a:solidFill>
+                </a:rPr>
+                <a:t>Founder Relationship</a:t>
+              </a:r>
+              <a:endParaRPr lang="en-US" sz="1400" dirty="0">
+                <a:solidFill>
+                  <a:srgbClr val="000000"/>
+                </a:solidFill>
+              </a:endParaRPr>
+            </a:p>
+          </p:txBody>
+        </p:sp>
+      </p:grpSp>
     </p:spTree>
     <p:extLst>
       <p:ext uri="{BB962C8B-B14F-4D97-AF65-F5344CB8AC3E}">
-        <p14:creationId xmlns:p14="http://schemas.microsoft.com/office/powerpoint/2010/main" val="1682049037"/>
+        <p14:creationId xmlns:p14="http://schemas.microsoft.com/office/powerpoint/2010/main" val="1848990576"/>
       </p:ext>
     </p:extLst>
   </p:cSld>

</xml_diff>